<commit_message>
7 Sept + Perubahan PPT
</commit_message>
<xml_diff>
--- a/SEM 1/B-INGGRIS/PERTEMUAN-2/TUGAS PRESENTASI.pptx
+++ b/SEM 1/B-INGGRIS/PERTEMUAN-2/TUGAS PRESENTASI.pptx
@@ -5,7 +5,7 @@
     <p:sldMasterId id="2147483671" r:id="rId1"/>
   </p:sldMasterIdLst>
   <p:notesMasterIdLst>
-    <p:notesMasterId r:id="rId19"/>
+    <p:notesMasterId r:id="rId20"/>
   </p:notesMasterIdLst>
   <p:sldIdLst>
     <p:sldId id="256" r:id="rId2"/>
@@ -24,47 +24,48 @@
     <p:sldId id="322" r:id="rId15"/>
     <p:sldId id="323" r:id="rId16"/>
     <p:sldId id="324" r:id="rId17"/>
-    <p:sldId id="274" r:id="rId18"/>
+    <p:sldId id="325" r:id="rId18"/>
+    <p:sldId id="274" r:id="rId19"/>
   </p:sldIdLst>
   <p:sldSz cx="9144000" cy="5143500" type="screen16x9"/>
   <p:notesSz cx="6858000" cy="9144000"/>
   <p:embeddedFontLst>
     <p:embeddedFont>
       <p:font typeface="Abel" panose="02000506030000020004" pitchFamily="2" charset="0"/>
-      <p:regular r:id="rId20"/>
+      <p:regular r:id="rId21"/>
     </p:embeddedFont>
     <p:embeddedFont>
       <p:font typeface="Bahiana" panose="020B0604020202020204" charset="0"/>
-      <p:regular r:id="rId21"/>
+      <p:regular r:id="rId22"/>
     </p:embeddedFont>
     <p:embeddedFont>
       <p:font typeface="Fira Sans Extra Condensed Medium" panose="020B0604020202020204" charset="0"/>
-      <p:regular r:id="rId22"/>
-      <p:bold r:id="rId23"/>
-      <p:italic r:id="rId24"/>
-      <p:boldItalic r:id="rId25"/>
+      <p:regular r:id="rId23"/>
+      <p:bold r:id="rId24"/>
+      <p:italic r:id="rId25"/>
+      <p:boldItalic r:id="rId26"/>
     </p:embeddedFont>
     <p:embeddedFont>
       <p:font typeface="Hepta Slab Medium" panose="020B0604020202020204" charset="0"/>
-      <p:regular r:id="rId26"/>
-      <p:bold r:id="rId27"/>
+      <p:regular r:id="rId27"/>
+      <p:bold r:id="rId28"/>
     </p:embeddedFont>
     <p:embeddedFont>
       <p:font typeface="Hepta Slab SemiBold" panose="020B0604020202020204" charset="0"/>
-      <p:regular r:id="rId28"/>
-      <p:bold r:id="rId29"/>
+      <p:regular r:id="rId29"/>
+      <p:bold r:id="rId30"/>
     </p:embeddedFont>
     <p:embeddedFont>
       <p:font typeface="Oswald SemiBold" panose="00000700000000000000" pitchFamily="2" charset="0"/>
-      <p:regular r:id="rId30"/>
-      <p:bold r:id="rId31"/>
+      <p:regular r:id="rId31"/>
+      <p:bold r:id="rId32"/>
     </p:embeddedFont>
     <p:embeddedFont>
       <p:font typeface="Sansita" panose="020B0604020202020204" charset="0"/>
-      <p:regular r:id="rId32"/>
-      <p:bold r:id="rId33"/>
-      <p:italic r:id="rId34"/>
-      <p:boldItalic r:id="rId35"/>
+      <p:regular r:id="rId33"/>
+      <p:bold r:id="rId34"/>
+      <p:italic r:id="rId35"/>
+      <p:boldItalic r:id="rId36"/>
     </p:embeddedFont>
   </p:embeddedFontLst>
   <p:defaultTextStyle>
@@ -296,6 +297,11 @@
       </a:defRPr>
     </a:lvl9pPr>
   </p:defaultTextStyle>
+  <p:extLst>
+    <p:ext uri="{EFAFB233-063F-42B5-8137-9DF3F51BA10A}">
+      <p15:sldGuideLst xmlns:p15="http://schemas.microsoft.com/office/powerpoint/2012/main"/>
+    </p:ext>
+  </p:extLst>
 </p:presentation>
 </file>
 
@@ -312,7 +318,7 @@
   <pc:docChgLst>
     <pc:chgData name="mamangrakai@outlook.com" userId="1b4cd58e31410fd6" providerId="LiveId" clId="{55E68ACF-CC4A-44D0-8DB9-95E48232258B}"/>
     <pc:docChg chg="undo custSel addSld delSld modSld sldOrd delMainMaster">
-      <pc:chgData name="mamangrakai@outlook.com" userId="1b4cd58e31410fd6" providerId="LiveId" clId="{55E68ACF-CC4A-44D0-8DB9-95E48232258B}" dt="2023-09-05T15:09:46.335" v="1818" actId="207"/>
+      <pc:chgData name="mamangrakai@outlook.com" userId="1b4cd58e31410fd6" providerId="LiveId" clId="{55E68ACF-CC4A-44D0-8DB9-95E48232258B}" dt="2023-09-08T02:05:25.435" v="2535" actId="20577"/>
       <pc:docMkLst>
         <pc:docMk/>
       </pc:docMkLst>
@@ -1741,6 +1747,44 @@
           </ac:grpSpMkLst>
         </pc:grpChg>
       </pc:sldChg>
+      <pc:sldChg chg="modSp add mod ord">
+        <pc:chgData name="mamangrakai@outlook.com" userId="1b4cd58e31410fd6" providerId="LiveId" clId="{55E68ACF-CC4A-44D0-8DB9-95E48232258B}" dt="2023-09-08T02:05:25.435" v="2535" actId="20577"/>
+        <pc:sldMkLst>
+          <pc:docMk/>
+          <pc:sldMk cId="3205246658" sldId="325"/>
+        </pc:sldMkLst>
+        <pc:spChg chg="mod">
+          <ac:chgData name="mamangrakai@outlook.com" userId="1b4cd58e31410fd6" providerId="LiveId" clId="{55E68ACF-CC4A-44D0-8DB9-95E48232258B}" dt="2023-09-08T02:05:25.435" v="2535" actId="20577"/>
+          <ac:spMkLst>
+            <pc:docMk/>
+            <pc:sldMk cId="3205246658" sldId="325"/>
+            <ac:spMk id="245" creationId="{00000000-0000-0000-0000-000000000000}"/>
+          </ac:spMkLst>
+        </pc:spChg>
+        <pc:spChg chg="mod">
+          <ac:chgData name="mamangrakai@outlook.com" userId="1b4cd58e31410fd6" providerId="LiveId" clId="{55E68ACF-CC4A-44D0-8DB9-95E48232258B}" dt="2023-09-08T01:59:14.841" v="1844" actId="20577"/>
+          <ac:spMkLst>
+            <pc:docMk/>
+            <pc:sldMk cId="3205246658" sldId="325"/>
+            <ac:spMk id="246" creationId="{00000000-0000-0000-0000-000000000000}"/>
+          </ac:spMkLst>
+        </pc:spChg>
+        <pc:picChg chg="mod">
+          <ac:chgData name="mamangrakai@outlook.com" userId="1b4cd58e31410fd6" providerId="LiveId" clId="{55E68ACF-CC4A-44D0-8DB9-95E48232258B}" dt="2023-09-08T01:59:19.013" v="1855" actId="1038"/>
+          <ac:picMkLst>
+            <pc:docMk/>
+            <pc:sldMk cId="3205246658" sldId="325"/>
+            <ac:picMk id="3" creationId="{F219EB3A-6F9C-FB22-547F-01C86686BA8C}"/>
+          </ac:picMkLst>
+        </pc:picChg>
+      </pc:sldChg>
+      <pc:sldChg chg="new del">
+        <pc:chgData name="mamangrakai@outlook.com" userId="1b4cd58e31410fd6" providerId="LiveId" clId="{55E68ACF-CC4A-44D0-8DB9-95E48232258B}" dt="2023-09-08T02:01:50.471" v="1907" actId="47"/>
+        <pc:sldMkLst>
+          <pc:docMk/>
+          <pc:sldMk cId="4270037239" sldId="326"/>
+        </pc:sldMkLst>
+      </pc:sldChg>
       <pc:sldMasterChg chg="delSldLayout">
         <pc:chgData name="mamangrakai@outlook.com" userId="1b4cd58e31410fd6" providerId="LiveId" clId="{55E68ACF-CC4A-44D0-8DB9-95E48232258B}" dt="2023-09-05T15:08:06.608" v="1810" actId="47"/>
         <pc:sldMasterMkLst>
@@ -3197,6 +3241,115 @@
 </file>
 
 <file path=ppt/notesSlides/notesSlide17.xml><?xml version="1.0" encoding="utf-8"?>
+<p:notes xmlns:a="http://schemas.openxmlformats.org/drawingml/2006/main" xmlns:r="http://schemas.openxmlformats.org/officeDocument/2006/relationships" xmlns:p="http://schemas.openxmlformats.org/presentationml/2006/main" showMasterSp="0" showMasterPhAnim="0">
+  <p:cSld>
+    <p:spTree>
+      <p:nvGrpSpPr>
+        <p:cNvPr id="1" name="Shape 220"/>
+        <p:cNvGrpSpPr/>
+        <p:nvPr/>
+      </p:nvGrpSpPr>
+      <p:grpSpPr>
+        <a:xfrm>
+          <a:off x="0" y="0"/>
+          <a:ext cx="0" cy="0"/>
+          <a:chOff x="0" y="0"/>
+          <a:chExt cx="0" cy="0"/>
+        </a:xfrm>
+      </p:grpSpPr>
+      <p:sp>
+        <p:nvSpPr>
+          <p:cNvPr id="221" name="Google Shape;221;g6b20e22304_0_83:notes"/>
+          <p:cNvSpPr>
+            <a:spLocks noGrp="1" noRot="1" noChangeAspect="1"/>
+          </p:cNvSpPr>
+          <p:nvPr>
+            <p:ph type="sldImg" idx="2"/>
+          </p:nvPr>
+        </p:nvSpPr>
+        <p:spPr>
+          <a:xfrm>
+            <a:off x="381000" y="685800"/>
+            <a:ext cx="6096000" cy="3429000"/>
+          </a:xfrm>
+          <a:custGeom>
+            <a:avLst/>
+            <a:gdLst/>
+            <a:ahLst/>
+            <a:cxnLst/>
+            <a:rect l="l" t="t" r="r" b="b"/>
+            <a:pathLst>
+              <a:path w="120000" h="120000" extrusionOk="0">
+                <a:moveTo>
+                  <a:pt x="0" y="0"/>
+                </a:moveTo>
+                <a:lnTo>
+                  <a:pt x="120000" y="0"/>
+                </a:lnTo>
+                <a:lnTo>
+                  <a:pt x="120000" y="120000"/>
+                </a:lnTo>
+                <a:lnTo>
+                  <a:pt x="0" y="120000"/>
+                </a:lnTo>
+                <a:close/>
+              </a:path>
+            </a:pathLst>
+          </a:custGeom>
+        </p:spPr>
+      </p:sp>
+      <p:sp>
+        <p:nvSpPr>
+          <p:cNvPr id="222" name="Google Shape;222;g6b20e22304_0_83:notes"/>
+          <p:cNvSpPr txBox="1">
+            <a:spLocks noGrp="1"/>
+          </p:cNvSpPr>
+          <p:nvPr>
+            <p:ph type="body" idx="1"/>
+          </p:nvPr>
+        </p:nvSpPr>
+        <p:spPr>
+          <a:xfrm>
+            <a:off x="685800" y="4343400"/>
+            <a:ext cx="5486400" cy="4114800"/>
+          </a:xfrm>
+          <a:prstGeom prst="rect">
+            <a:avLst/>
+          </a:prstGeom>
+        </p:spPr>
+        <p:txBody>
+          <a:bodyPr spcFirstLastPara="1" wrap="square" lIns="91425" tIns="91425" rIns="91425" bIns="91425" anchor="t" anchorCtr="0">
+            <a:noAutofit/>
+          </a:bodyPr>
+          <a:lstStyle/>
+          <a:p>
+            <a:pPr marL="0" lvl="0" indent="0" algn="l" rtl="0">
+              <a:spcBef>
+                <a:spcPts val="0"/>
+              </a:spcBef>
+              <a:spcAft>
+                <a:spcPts val="0"/>
+              </a:spcAft>
+              <a:buNone/>
+            </a:pPr>
+            <a:endParaRPr/>
+          </a:p>
+        </p:txBody>
+      </p:sp>
+    </p:spTree>
+    <p:extLst>
+      <p:ext uri="{BB962C8B-B14F-4D97-AF65-F5344CB8AC3E}">
+        <p14:creationId xmlns:p14="http://schemas.microsoft.com/office/powerpoint/2010/main" val="3174279687"/>
+      </p:ext>
+    </p:extLst>
+  </p:cSld>
+  <p:clrMapOvr>
+    <a:masterClrMapping/>
+  </p:clrMapOvr>
+</p:notes>
+</file>
+
+<file path=ppt/notesSlides/notesSlide18.xml><?xml version="1.0" encoding="utf-8"?>
 <p:notes xmlns:a="http://schemas.openxmlformats.org/drawingml/2006/main" xmlns:r="http://schemas.openxmlformats.org/officeDocument/2006/relationships" xmlns:p="http://schemas.openxmlformats.org/presentationml/2006/main" showMasterSp="0" showMasterPhAnim="0">
   <p:cSld>
     <p:spTree>
@@ -23656,6 +23809,1747 @@
 </file>
 
 <file path=ppt/slides/slide17.xml><?xml version="1.0" encoding="utf-8"?>
+<p:sld xmlns:a="http://schemas.openxmlformats.org/drawingml/2006/main" xmlns:r="http://schemas.openxmlformats.org/officeDocument/2006/relationships" xmlns:p="http://schemas.openxmlformats.org/presentationml/2006/main">
+  <p:cSld>
+    <p:bg>
+      <p:bgPr>
+        <a:solidFill>
+          <a:schemeClr val="dk1"/>
+        </a:solidFill>
+        <a:effectLst/>
+      </p:bgPr>
+    </p:bg>
+    <p:spTree>
+      <p:nvGrpSpPr>
+        <p:cNvPr id="1" name="Shape 223"/>
+        <p:cNvGrpSpPr/>
+        <p:nvPr/>
+      </p:nvGrpSpPr>
+      <p:grpSpPr>
+        <a:xfrm>
+          <a:off x="0" y="0"/>
+          <a:ext cx="0" cy="0"/>
+          <a:chOff x="0" y="0"/>
+          <a:chExt cx="0" cy="0"/>
+        </a:xfrm>
+      </p:grpSpPr>
+      <p:sp>
+        <p:nvSpPr>
+          <p:cNvPr id="224" name="Google Shape;224;p27"/>
+          <p:cNvSpPr/>
+          <p:nvPr/>
+        </p:nvSpPr>
+        <p:spPr>
+          <a:xfrm>
+            <a:off x="0" y="-1362"/>
+            <a:ext cx="9144000" cy="392400"/>
+          </a:xfrm>
+          <a:prstGeom prst="rect">
+            <a:avLst/>
+          </a:prstGeom>
+          <a:solidFill>
+            <a:srgbClr val="434343"/>
+          </a:solidFill>
+          <a:ln>
+            <a:noFill/>
+          </a:ln>
+        </p:spPr>
+        <p:txBody>
+          <a:bodyPr spcFirstLastPara="1" wrap="square" lIns="91425" tIns="91425" rIns="91425" bIns="91425" anchor="ctr" anchorCtr="0">
+            <a:noAutofit/>
+          </a:bodyPr>
+          <a:lstStyle/>
+          <a:p>
+            <a:pPr marL="0" lvl="0" indent="0" algn="l" rtl="0">
+              <a:spcBef>
+                <a:spcPts val="0"/>
+              </a:spcBef>
+              <a:spcAft>
+                <a:spcPts val="0"/>
+              </a:spcAft>
+              <a:buNone/>
+            </a:pPr>
+            <a:endParaRPr/>
+          </a:p>
+        </p:txBody>
+      </p:sp>
+      <p:sp>
+        <p:nvSpPr>
+          <p:cNvPr id="225" name="Google Shape;225;p27"/>
+          <p:cNvSpPr/>
+          <p:nvPr/>
+        </p:nvSpPr>
+        <p:spPr>
+          <a:xfrm>
+            <a:off x="-50" y="-1362"/>
+            <a:ext cx="693900" cy="392400"/>
+          </a:xfrm>
+          <a:prstGeom prst="rect">
+            <a:avLst/>
+          </a:prstGeom>
+          <a:solidFill>
+            <a:schemeClr val="accent6"/>
+          </a:solidFill>
+          <a:ln>
+            <a:noFill/>
+          </a:ln>
+        </p:spPr>
+        <p:txBody>
+          <a:bodyPr spcFirstLastPara="1" wrap="square" lIns="91425" tIns="91425" rIns="91425" bIns="91425" anchor="ctr" anchorCtr="0">
+            <a:noAutofit/>
+          </a:bodyPr>
+          <a:lstStyle/>
+          <a:p>
+            <a:pPr marL="0" lvl="0" indent="0" algn="l" rtl="0">
+              <a:spcBef>
+                <a:spcPts val="0"/>
+              </a:spcBef>
+              <a:spcAft>
+                <a:spcPts val="0"/>
+              </a:spcAft>
+              <a:buNone/>
+            </a:pPr>
+            <a:endParaRPr/>
+          </a:p>
+        </p:txBody>
+      </p:sp>
+      <p:sp>
+        <p:nvSpPr>
+          <p:cNvPr id="226" name="Google Shape;226;p27">
+            <a:hlinkClick r:id="rId3"/>
+          </p:cNvPr>
+          <p:cNvSpPr/>
+          <p:nvPr/>
+        </p:nvSpPr>
+        <p:spPr>
+          <a:xfrm>
+            <a:off x="693867" y="-1362"/>
+            <a:ext cx="1408200" cy="392400"/>
+          </a:xfrm>
+          <a:prstGeom prst="rect">
+            <a:avLst/>
+          </a:prstGeom>
+          <a:solidFill>
+            <a:schemeClr val="lt1"/>
+          </a:solidFill>
+          <a:ln>
+            <a:noFill/>
+          </a:ln>
+        </p:spPr>
+        <p:txBody>
+          <a:bodyPr spcFirstLastPara="1" wrap="square" lIns="91425" tIns="91425" rIns="91425" bIns="91425" anchor="ctr" anchorCtr="0">
+            <a:noAutofit/>
+          </a:bodyPr>
+          <a:lstStyle/>
+          <a:p>
+            <a:pPr marL="0" lvl="0" indent="0" algn="l" rtl="0">
+              <a:spcBef>
+                <a:spcPts val="0"/>
+              </a:spcBef>
+              <a:spcAft>
+                <a:spcPts val="0"/>
+              </a:spcAft>
+              <a:buNone/>
+            </a:pPr>
+            <a:endParaRPr/>
+          </a:p>
+        </p:txBody>
+      </p:sp>
+      <p:sp>
+        <p:nvSpPr>
+          <p:cNvPr id="227" name="Google Shape;227;p27">
+            <a:hlinkClick r:id="rId4"/>
+          </p:cNvPr>
+          <p:cNvSpPr/>
+          <p:nvPr/>
+        </p:nvSpPr>
+        <p:spPr>
+          <a:xfrm>
+            <a:off x="2102224" y="-1362"/>
+            <a:ext cx="1408200" cy="392400"/>
+          </a:xfrm>
+          <a:prstGeom prst="rect">
+            <a:avLst/>
+          </a:prstGeom>
+          <a:solidFill>
+            <a:srgbClr val="434343"/>
+          </a:solidFill>
+          <a:ln>
+            <a:noFill/>
+          </a:ln>
+        </p:spPr>
+        <p:txBody>
+          <a:bodyPr spcFirstLastPara="1" wrap="square" lIns="91425" tIns="91425" rIns="91425" bIns="91425" anchor="ctr" anchorCtr="0">
+            <a:noAutofit/>
+          </a:bodyPr>
+          <a:lstStyle/>
+          <a:p>
+            <a:pPr marL="0" lvl="0" indent="0" algn="l" rtl="0">
+              <a:spcBef>
+                <a:spcPts val="0"/>
+              </a:spcBef>
+              <a:spcAft>
+                <a:spcPts val="0"/>
+              </a:spcAft>
+              <a:buNone/>
+            </a:pPr>
+            <a:endParaRPr/>
+          </a:p>
+        </p:txBody>
+      </p:sp>
+      <p:sp>
+        <p:nvSpPr>
+          <p:cNvPr id="228" name="Google Shape;228;p27">
+            <a:hlinkClick r:id="" action="ppaction://noaction"/>
+          </p:cNvPr>
+          <p:cNvSpPr/>
+          <p:nvPr/>
+        </p:nvSpPr>
+        <p:spPr>
+          <a:xfrm>
+            <a:off x="3510581" y="-1362"/>
+            <a:ext cx="1408200" cy="392400"/>
+          </a:xfrm>
+          <a:prstGeom prst="rect">
+            <a:avLst/>
+          </a:prstGeom>
+          <a:solidFill>
+            <a:srgbClr val="434343"/>
+          </a:solidFill>
+          <a:ln>
+            <a:noFill/>
+          </a:ln>
+        </p:spPr>
+        <p:txBody>
+          <a:bodyPr spcFirstLastPara="1" wrap="square" lIns="91425" tIns="91425" rIns="91425" bIns="91425" anchor="ctr" anchorCtr="0">
+            <a:noAutofit/>
+          </a:bodyPr>
+          <a:lstStyle/>
+          <a:p>
+            <a:pPr marL="0" lvl="0" indent="0" algn="l" rtl="0">
+              <a:spcBef>
+                <a:spcPts val="0"/>
+              </a:spcBef>
+              <a:spcAft>
+                <a:spcPts val="0"/>
+              </a:spcAft>
+              <a:buNone/>
+            </a:pPr>
+            <a:endParaRPr/>
+          </a:p>
+        </p:txBody>
+      </p:sp>
+      <p:sp>
+        <p:nvSpPr>
+          <p:cNvPr id="229" name="Google Shape;229;p27">
+            <a:hlinkClick r:id="" action="ppaction://noaction"/>
+          </p:cNvPr>
+          <p:cNvSpPr/>
+          <p:nvPr/>
+        </p:nvSpPr>
+        <p:spPr>
+          <a:xfrm>
+            <a:off x="4918938" y="-1362"/>
+            <a:ext cx="1408200" cy="392400"/>
+          </a:xfrm>
+          <a:prstGeom prst="rect">
+            <a:avLst/>
+          </a:prstGeom>
+          <a:solidFill>
+            <a:srgbClr val="434343"/>
+          </a:solidFill>
+          <a:ln>
+            <a:noFill/>
+          </a:ln>
+        </p:spPr>
+        <p:txBody>
+          <a:bodyPr spcFirstLastPara="1" wrap="square" lIns="91425" tIns="91425" rIns="91425" bIns="91425" anchor="ctr" anchorCtr="0">
+            <a:noAutofit/>
+          </a:bodyPr>
+          <a:lstStyle/>
+          <a:p>
+            <a:pPr marL="0" lvl="0" indent="0" algn="l" rtl="0">
+              <a:spcBef>
+                <a:spcPts val="0"/>
+              </a:spcBef>
+              <a:spcAft>
+                <a:spcPts val="0"/>
+              </a:spcAft>
+              <a:buNone/>
+            </a:pPr>
+            <a:endParaRPr/>
+          </a:p>
+        </p:txBody>
+      </p:sp>
+      <p:sp>
+        <p:nvSpPr>
+          <p:cNvPr id="230" name="Google Shape;230;p27">
+            <a:hlinkClick r:id="" action="ppaction://noaction"/>
+          </p:cNvPr>
+          <p:cNvSpPr/>
+          <p:nvPr/>
+        </p:nvSpPr>
+        <p:spPr>
+          <a:xfrm>
+            <a:off x="6327295" y="-1362"/>
+            <a:ext cx="1408200" cy="392400"/>
+          </a:xfrm>
+          <a:prstGeom prst="rect">
+            <a:avLst/>
+          </a:prstGeom>
+          <a:solidFill>
+            <a:srgbClr val="434343"/>
+          </a:solidFill>
+          <a:ln>
+            <a:noFill/>
+          </a:ln>
+        </p:spPr>
+        <p:txBody>
+          <a:bodyPr spcFirstLastPara="1" wrap="square" lIns="91425" tIns="91425" rIns="91425" bIns="91425" anchor="ctr" anchorCtr="0">
+            <a:noAutofit/>
+          </a:bodyPr>
+          <a:lstStyle/>
+          <a:p>
+            <a:pPr marL="0" lvl="0" indent="0" algn="l" rtl="0">
+              <a:spcBef>
+                <a:spcPts val="0"/>
+              </a:spcBef>
+              <a:spcAft>
+                <a:spcPts val="0"/>
+              </a:spcAft>
+              <a:buNone/>
+            </a:pPr>
+            <a:endParaRPr/>
+          </a:p>
+        </p:txBody>
+      </p:sp>
+      <p:sp>
+        <p:nvSpPr>
+          <p:cNvPr id="231" name="Google Shape;231;p27">
+            <a:hlinkClick r:id="rId5"/>
+          </p:cNvPr>
+          <p:cNvSpPr/>
+          <p:nvPr/>
+        </p:nvSpPr>
+        <p:spPr>
+          <a:xfrm>
+            <a:off x="7735644" y="-1362"/>
+            <a:ext cx="1408200" cy="392400"/>
+          </a:xfrm>
+          <a:prstGeom prst="rect">
+            <a:avLst/>
+          </a:prstGeom>
+          <a:solidFill>
+            <a:srgbClr val="434343"/>
+          </a:solidFill>
+          <a:ln>
+            <a:noFill/>
+          </a:ln>
+        </p:spPr>
+        <p:txBody>
+          <a:bodyPr spcFirstLastPara="1" wrap="square" lIns="91425" tIns="91425" rIns="91425" bIns="91425" anchor="ctr" anchorCtr="0">
+            <a:noAutofit/>
+          </a:bodyPr>
+          <a:lstStyle/>
+          <a:p>
+            <a:pPr marL="0" lvl="0" indent="0" algn="l" rtl="0">
+              <a:spcBef>
+                <a:spcPts val="0"/>
+              </a:spcBef>
+              <a:spcAft>
+                <a:spcPts val="0"/>
+              </a:spcAft>
+              <a:buNone/>
+            </a:pPr>
+            <a:endParaRPr/>
+          </a:p>
+        </p:txBody>
+      </p:sp>
+      <p:grpSp>
+        <p:nvGrpSpPr>
+          <p:cNvPr id="232" name="Google Shape;232;p27"/>
+          <p:cNvGrpSpPr/>
+          <p:nvPr/>
+        </p:nvGrpSpPr>
+        <p:grpSpPr>
+          <a:xfrm>
+            <a:off x="238515" y="90242"/>
+            <a:ext cx="216784" cy="199039"/>
+            <a:chOff x="285677" y="4429254"/>
+            <a:chExt cx="216784" cy="199039"/>
+          </a:xfrm>
+        </p:grpSpPr>
+        <p:sp>
+          <p:nvSpPr>
+            <p:cNvPr id="233" name="Google Shape;233;p27"/>
+            <p:cNvSpPr/>
+            <p:nvPr/>
+          </p:nvSpPr>
+          <p:spPr>
+            <a:xfrm>
+              <a:off x="319382" y="4457450"/>
+              <a:ext cx="28008" cy="38390"/>
+            </a:xfrm>
+            <a:custGeom>
+              <a:avLst/>
+              <a:gdLst/>
+              <a:ahLst/>
+              <a:cxnLst/>
+              <a:rect l="l" t="t" r="r" b="b"/>
+              <a:pathLst>
+                <a:path w="1839" h="2519" extrusionOk="0">
+                  <a:moveTo>
+                    <a:pt x="0" y="1"/>
+                  </a:moveTo>
+                  <a:lnTo>
+                    <a:pt x="0" y="2519"/>
+                  </a:lnTo>
+                  <a:lnTo>
+                    <a:pt x="1838" y="923"/>
+                  </a:lnTo>
+                  <a:lnTo>
+                    <a:pt x="1838" y="1"/>
+                  </a:lnTo>
+                  <a:close/>
+                </a:path>
+              </a:pathLst>
+            </a:custGeom>
+            <a:solidFill>
+              <a:srgbClr val="F6C5BE"/>
+            </a:solidFill>
+            <a:ln>
+              <a:noFill/>
+            </a:ln>
+          </p:spPr>
+          <p:txBody>
+            <a:bodyPr spcFirstLastPara="1" wrap="square" lIns="91425" tIns="91425" rIns="91425" bIns="91425" anchor="ctr" anchorCtr="0">
+              <a:noAutofit/>
+            </a:bodyPr>
+            <a:lstStyle/>
+            <a:p>
+              <a:pPr marL="0" lvl="0" indent="0" algn="l" rtl="0">
+                <a:spcBef>
+                  <a:spcPts val="0"/>
+                </a:spcBef>
+                <a:spcAft>
+                  <a:spcPts val="0"/>
+                </a:spcAft>
+                <a:buNone/>
+              </a:pPr>
+              <a:endParaRPr/>
+            </a:p>
+          </p:txBody>
+        </p:sp>
+        <p:sp>
+          <p:nvSpPr>
+            <p:cNvPr id="234" name="Google Shape;234;p27"/>
+            <p:cNvSpPr/>
+            <p:nvPr/>
+          </p:nvSpPr>
+          <p:spPr>
+            <a:xfrm>
+              <a:off x="332800" y="4457450"/>
+              <a:ext cx="14590" cy="26761"/>
+            </a:xfrm>
+            <a:custGeom>
+              <a:avLst/>
+              <a:gdLst/>
+              <a:ahLst/>
+              <a:cxnLst/>
+              <a:rect l="l" t="t" r="r" b="b"/>
+              <a:pathLst>
+                <a:path w="958" h="1756" extrusionOk="0">
+                  <a:moveTo>
+                    <a:pt x="0" y="1"/>
+                  </a:moveTo>
+                  <a:lnTo>
+                    <a:pt x="0" y="1756"/>
+                  </a:lnTo>
+                  <a:lnTo>
+                    <a:pt x="957" y="923"/>
+                  </a:lnTo>
+                  <a:lnTo>
+                    <a:pt x="957" y="1"/>
+                  </a:lnTo>
+                  <a:close/>
+                </a:path>
+              </a:pathLst>
+            </a:custGeom>
+            <a:solidFill>
+              <a:srgbClr val="F9ABA0"/>
+            </a:solidFill>
+            <a:ln>
+              <a:noFill/>
+            </a:ln>
+          </p:spPr>
+          <p:txBody>
+            <a:bodyPr spcFirstLastPara="1" wrap="square" lIns="91425" tIns="91425" rIns="91425" bIns="91425" anchor="ctr" anchorCtr="0">
+              <a:noAutofit/>
+            </a:bodyPr>
+            <a:lstStyle/>
+            <a:p>
+              <a:pPr marL="0" lvl="0" indent="0" algn="l" rtl="0">
+                <a:spcBef>
+                  <a:spcPts val="0"/>
+                </a:spcBef>
+                <a:spcAft>
+                  <a:spcPts val="0"/>
+                </a:spcAft>
+                <a:buNone/>
+              </a:pPr>
+              <a:endParaRPr/>
+            </a:p>
+          </p:txBody>
+        </p:sp>
+        <p:sp>
+          <p:nvSpPr>
+            <p:cNvPr id="235" name="Google Shape;235;p27"/>
+            <p:cNvSpPr/>
+            <p:nvPr/>
+          </p:nvSpPr>
+          <p:spPr>
+            <a:xfrm>
+              <a:off x="312406" y="4452512"/>
+              <a:ext cx="163220" cy="175778"/>
+            </a:xfrm>
+            <a:custGeom>
+              <a:avLst/>
+              <a:gdLst/>
+              <a:ahLst/>
+              <a:cxnLst/>
+              <a:rect l="l" t="t" r="r" b="b"/>
+              <a:pathLst>
+                <a:path w="10717" h="11534" extrusionOk="0">
+                  <a:moveTo>
+                    <a:pt x="5359" y="1"/>
+                  </a:moveTo>
+                  <a:cubicBezTo>
+                    <a:pt x="5333" y="1"/>
+                    <a:pt x="5307" y="9"/>
+                    <a:pt x="5286" y="27"/>
+                  </a:cubicBezTo>
+                  <a:lnTo>
+                    <a:pt x="0" y="4625"/>
+                  </a:lnTo>
+                  <a:lnTo>
+                    <a:pt x="0" y="11222"/>
+                  </a:lnTo>
+                  <a:cubicBezTo>
+                    <a:pt x="0" y="11395"/>
+                    <a:pt x="146" y="11534"/>
+                    <a:pt x="319" y="11534"/>
+                  </a:cubicBezTo>
+                  <a:lnTo>
+                    <a:pt x="10405" y="11534"/>
+                  </a:lnTo>
+                  <a:cubicBezTo>
+                    <a:pt x="10578" y="11534"/>
+                    <a:pt x="10717" y="11395"/>
+                    <a:pt x="10717" y="11222"/>
+                  </a:cubicBezTo>
+                  <a:lnTo>
+                    <a:pt x="10717" y="4625"/>
+                  </a:lnTo>
+                  <a:lnTo>
+                    <a:pt x="5431" y="27"/>
+                  </a:lnTo>
+                  <a:cubicBezTo>
+                    <a:pt x="5411" y="9"/>
+                    <a:pt x="5385" y="1"/>
+                    <a:pt x="5359" y="1"/>
+                  </a:cubicBezTo>
+                  <a:close/>
+                </a:path>
+              </a:pathLst>
+            </a:custGeom>
+            <a:solidFill>
+              <a:srgbClr val="FCE5CD"/>
+            </a:solidFill>
+            <a:ln>
+              <a:noFill/>
+            </a:ln>
+          </p:spPr>
+          <p:txBody>
+            <a:bodyPr spcFirstLastPara="1" wrap="square" lIns="91425" tIns="91425" rIns="91425" bIns="91425" anchor="ctr" anchorCtr="0">
+              <a:noAutofit/>
+            </a:bodyPr>
+            <a:lstStyle/>
+            <a:p>
+              <a:pPr marL="0" lvl="0" indent="0" algn="l" rtl="0">
+                <a:spcBef>
+                  <a:spcPts val="0"/>
+                </a:spcBef>
+                <a:spcAft>
+                  <a:spcPts val="0"/>
+                </a:spcAft>
+                <a:buNone/>
+              </a:pPr>
+              <a:endParaRPr/>
+            </a:p>
+          </p:txBody>
+        </p:sp>
+        <p:sp>
+          <p:nvSpPr>
+            <p:cNvPr id="236" name="Google Shape;236;p27"/>
+            <p:cNvSpPr/>
+            <p:nvPr/>
+          </p:nvSpPr>
+          <p:spPr>
+            <a:xfrm>
+              <a:off x="386456" y="4452512"/>
+              <a:ext cx="89172" cy="175778"/>
+            </a:xfrm>
+            <a:custGeom>
+              <a:avLst/>
+              <a:gdLst/>
+              <a:ahLst/>
+              <a:cxnLst/>
+              <a:rect l="l" t="t" r="r" b="b"/>
+              <a:pathLst>
+                <a:path w="5855" h="11534" extrusionOk="0">
+                  <a:moveTo>
+                    <a:pt x="497" y="1"/>
+                  </a:moveTo>
+                  <a:cubicBezTo>
+                    <a:pt x="471" y="1"/>
+                    <a:pt x="445" y="9"/>
+                    <a:pt x="424" y="27"/>
+                  </a:cubicBezTo>
+                  <a:lnTo>
+                    <a:pt x="1" y="394"/>
+                  </a:lnTo>
+                  <a:cubicBezTo>
+                    <a:pt x="1901" y="2010"/>
+                    <a:pt x="4918" y="4625"/>
+                    <a:pt x="4918" y="4625"/>
+                  </a:cubicBezTo>
+                  <a:lnTo>
+                    <a:pt x="4918" y="11222"/>
+                  </a:lnTo>
+                  <a:cubicBezTo>
+                    <a:pt x="4918" y="11395"/>
+                    <a:pt x="4773" y="11534"/>
+                    <a:pt x="4599" y="11534"/>
+                  </a:cubicBezTo>
+                  <a:lnTo>
+                    <a:pt x="5543" y="11534"/>
+                  </a:lnTo>
+                  <a:cubicBezTo>
+                    <a:pt x="5716" y="11534"/>
+                    <a:pt x="5855" y="11395"/>
+                    <a:pt x="5855" y="11222"/>
+                  </a:cubicBezTo>
+                  <a:lnTo>
+                    <a:pt x="5855" y="4625"/>
+                  </a:lnTo>
+                  <a:lnTo>
+                    <a:pt x="569" y="27"/>
+                  </a:lnTo>
+                  <a:cubicBezTo>
+                    <a:pt x="549" y="9"/>
+                    <a:pt x="523" y="1"/>
+                    <a:pt x="497" y="1"/>
+                  </a:cubicBezTo>
+                  <a:close/>
+                </a:path>
+              </a:pathLst>
+            </a:custGeom>
+            <a:solidFill>
+              <a:srgbClr val="FF7058"/>
+            </a:solidFill>
+            <a:ln>
+              <a:noFill/>
+            </a:ln>
+          </p:spPr>
+          <p:txBody>
+            <a:bodyPr spcFirstLastPara="1" wrap="square" lIns="91425" tIns="91425" rIns="91425" bIns="91425" anchor="ctr" anchorCtr="0">
+              <a:noAutofit/>
+            </a:bodyPr>
+            <a:lstStyle/>
+            <a:p>
+              <a:pPr marL="0" lvl="0" indent="0" algn="l" rtl="0">
+                <a:spcBef>
+                  <a:spcPts val="0"/>
+                </a:spcBef>
+                <a:spcAft>
+                  <a:spcPts val="0"/>
+                </a:spcAft>
+                <a:buNone/>
+              </a:pPr>
+              <a:endParaRPr/>
+            </a:p>
+          </p:txBody>
+        </p:sp>
+        <p:sp>
+          <p:nvSpPr>
+            <p:cNvPr id="237" name="Google Shape;237;p27"/>
+            <p:cNvSpPr/>
+            <p:nvPr/>
+          </p:nvSpPr>
+          <p:spPr>
+            <a:xfrm>
+              <a:off x="312513" y="4446675"/>
+              <a:ext cx="40679" cy="12802"/>
+            </a:xfrm>
+            <a:custGeom>
+              <a:avLst/>
+              <a:gdLst/>
+              <a:ahLst/>
+              <a:cxnLst/>
+              <a:rect l="l" t="t" r="r" b="b"/>
+              <a:pathLst>
+                <a:path w="2671" h="840" extrusionOk="0">
+                  <a:moveTo>
+                    <a:pt x="118" y="0"/>
+                  </a:moveTo>
+                  <a:cubicBezTo>
+                    <a:pt x="49" y="0"/>
+                    <a:pt x="0" y="49"/>
+                    <a:pt x="0" y="118"/>
+                  </a:cubicBezTo>
+                  <a:lnTo>
+                    <a:pt x="0" y="722"/>
+                  </a:lnTo>
+                  <a:cubicBezTo>
+                    <a:pt x="0" y="791"/>
+                    <a:pt x="49" y="840"/>
+                    <a:pt x="118" y="840"/>
+                  </a:cubicBezTo>
+                  <a:lnTo>
+                    <a:pt x="2553" y="840"/>
+                  </a:lnTo>
+                  <a:cubicBezTo>
+                    <a:pt x="2615" y="840"/>
+                    <a:pt x="2671" y="791"/>
+                    <a:pt x="2671" y="722"/>
+                  </a:cubicBezTo>
+                  <a:lnTo>
+                    <a:pt x="2671" y="118"/>
+                  </a:lnTo>
+                  <a:cubicBezTo>
+                    <a:pt x="2671" y="49"/>
+                    <a:pt x="2615" y="0"/>
+                    <a:pt x="2553" y="0"/>
+                  </a:cubicBezTo>
+                  <a:close/>
+                </a:path>
+              </a:pathLst>
+            </a:custGeom>
+            <a:solidFill>
+              <a:srgbClr val="E55A43"/>
+            </a:solidFill>
+            <a:ln>
+              <a:noFill/>
+            </a:ln>
+          </p:spPr>
+          <p:txBody>
+            <a:bodyPr spcFirstLastPara="1" wrap="square" lIns="91425" tIns="91425" rIns="91425" bIns="91425" anchor="ctr" anchorCtr="0">
+              <a:noAutofit/>
+            </a:bodyPr>
+            <a:lstStyle/>
+            <a:p>
+              <a:pPr marL="0" lvl="0" indent="0" algn="l" rtl="0">
+                <a:spcBef>
+                  <a:spcPts val="0"/>
+                </a:spcBef>
+                <a:spcAft>
+                  <a:spcPts val="0"/>
+                </a:spcAft>
+                <a:buNone/>
+              </a:pPr>
+              <a:endParaRPr/>
+            </a:p>
+          </p:txBody>
+        </p:sp>
+        <p:sp>
+          <p:nvSpPr>
+            <p:cNvPr id="238" name="Google Shape;238;p27"/>
+            <p:cNvSpPr/>
+            <p:nvPr/>
+          </p:nvSpPr>
+          <p:spPr>
+            <a:xfrm>
+              <a:off x="371347" y="4540969"/>
+              <a:ext cx="49345" cy="87325"/>
+            </a:xfrm>
+            <a:custGeom>
+              <a:avLst/>
+              <a:gdLst/>
+              <a:ahLst/>
+              <a:cxnLst/>
+              <a:rect l="l" t="t" r="r" b="b"/>
+              <a:pathLst>
+                <a:path w="3240" h="5730" extrusionOk="0">
+                  <a:moveTo>
+                    <a:pt x="292" y="0"/>
+                  </a:moveTo>
+                  <a:cubicBezTo>
+                    <a:pt x="133" y="0"/>
+                    <a:pt x="1" y="132"/>
+                    <a:pt x="1" y="292"/>
+                  </a:cubicBezTo>
+                  <a:lnTo>
+                    <a:pt x="1" y="5730"/>
+                  </a:lnTo>
+                  <a:lnTo>
+                    <a:pt x="3240" y="5730"/>
+                  </a:lnTo>
+                  <a:lnTo>
+                    <a:pt x="3240" y="292"/>
+                  </a:lnTo>
+                  <a:cubicBezTo>
+                    <a:pt x="3240" y="132"/>
+                    <a:pt x="3108" y="0"/>
+                    <a:pt x="2942" y="0"/>
+                  </a:cubicBezTo>
+                  <a:close/>
+                </a:path>
+              </a:pathLst>
+            </a:custGeom>
+            <a:solidFill>
+              <a:srgbClr val="E55A43"/>
+            </a:solidFill>
+            <a:ln>
+              <a:noFill/>
+            </a:ln>
+          </p:spPr>
+          <p:txBody>
+            <a:bodyPr spcFirstLastPara="1" wrap="square" lIns="91425" tIns="91425" rIns="91425" bIns="91425" anchor="ctr" anchorCtr="0">
+              <a:noAutofit/>
+            </a:bodyPr>
+            <a:lstStyle/>
+            <a:p>
+              <a:pPr marL="0" lvl="0" indent="0" algn="l" rtl="0">
+                <a:spcBef>
+                  <a:spcPts val="0"/>
+                </a:spcBef>
+                <a:spcAft>
+                  <a:spcPts val="0"/>
+                </a:spcAft>
+                <a:buNone/>
+              </a:pPr>
+              <a:endParaRPr/>
+            </a:p>
+          </p:txBody>
+        </p:sp>
+        <p:sp>
+          <p:nvSpPr>
+            <p:cNvPr id="239" name="Google Shape;239;p27"/>
+            <p:cNvSpPr/>
+            <p:nvPr/>
+          </p:nvSpPr>
+          <p:spPr>
+            <a:xfrm>
+              <a:off x="401457" y="4540969"/>
+              <a:ext cx="19235" cy="87325"/>
+            </a:xfrm>
+            <a:custGeom>
+              <a:avLst/>
+              <a:gdLst/>
+              <a:ahLst/>
+              <a:cxnLst/>
+              <a:rect l="l" t="t" r="r" b="b"/>
+              <a:pathLst>
+                <a:path w="1263" h="5730" extrusionOk="0">
+                  <a:moveTo>
+                    <a:pt x="1" y="0"/>
+                  </a:moveTo>
+                  <a:cubicBezTo>
+                    <a:pt x="167" y="0"/>
+                    <a:pt x="299" y="132"/>
+                    <a:pt x="299" y="292"/>
+                  </a:cubicBezTo>
+                  <a:lnTo>
+                    <a:pt x="299" y="5730"/>
+                  </a:lnTo>
+                  <a:lnTo>
+                    <a:pt x="1263" y="5730"/>
+                  </a:lnTo>
+                  <a:lnTo>
+                    <a:pt x="1263" y="292"/>
+                  </a:lnTo>
+                  <a:cubicBezTo>
+                    <a:pt x="1263" y="132"/>
+                    <a:pt x="1131" y="0"/>
+                    <a:pt x="965" y="0"/>
+                  </a:cubicBezTo>
+                  <a:close/>
+                </a:path>
+              </a:pathLst>
+            </a:custGeom>
+            <a:solidFill>
+              <a:srgbClr val="FF7058"/>
+            </a:solidFill>
+            <a:ln>
+              <a:noFill/>
+            </a:ln>
+          </p:spPr>
+          <p:txBody>
+            <a:bodyPr spcFirstLastPara="1" wrap="square" lIns="91425" tIns="91425" rIns="91425" bIns="91425" anchor="ctr" anchorCtr="0">
+              <a:noAutofit/>
+            </a:bodyPr>
+            <a:lstStyle/>
+            <a:p>
+              <a:pPr marL="0" lvl="0" indent="0" algn="l" rtl="0">
+                <a:spcBef>
+                  <a:spcPts val="0"/>
+                </a:spcBef>
+                <a:spcAft>
+                  <a:spcPts val="0"/>
+                </a:spcAft>
+                <a:buNone/>
+              </a:pPr>
+              <a:endParaRPr/>
+            </a:p>
+          </p:txBody>
+        </p:sp>
+        <p:sp>
+          <p:nvSpPr>
+            <p:cNvPr id="240" name="Google Shape;240;p27"/>
+            <p:cNvSpPr/>
+            <p:nvPr/>
+          </p:nvSpPr>
+          <p:spPr>
+            <a:xfrm>
+              <a:off x="285677" y="4429254"/>
+              <a:ext cx="216784" cy="95768"/>
+            </a:xfrm>
+            <a:custGeom>
+              <a:avLst/>
+              <a:gdLst/>
+              <a:ahLst/>
+              <a:cxnLst/>
+              <a:rect l="l" t="t" r="r" b="b"/>
+              <a:pathLst>
+                <a:path w="14234" h="6284" extrusionOk="0">
+                  <a:moveTo>
+                    <a:pt x="7114" y="1"/>
+                  </a:moveTo>
+                  <a:cubicBezTo>
+                    <a:pt x="7088" y="1"/>
+                    <a:pt x="7062" y="9"/>
+                    <a:pt x="7041" y="27"/>
+                  </a:cubicBezTo>
+                  <a:lnTo>
+                    <a:pt x="77" y="6089"/>
+                  </a:lnTo>
+                  <a:cubicBezTo>
+                    <a:pt x="1" y="6158"/>
+                    <a:pt x="49" y="6283"/>
+                    <a:pt x="153" y="6283"/>
+                  </a:cubicBezTo>
+                  <a:lnTo>
+                    <a:pt x="1762" y="6283"/>
+                  </a:lnTo>
+                  <a:lnTo>
+                    <a:pt x="7041" y="1691"/>
+                  </a:lnTo>
+                  <a:cubicBezTo>
+                    <a:pt x="7062" y="1674"/>
+                    <a:pt x="7088" y="1665"/>
+                    <a:pt x="7114" y="1665"/>
+                  </a:cubicBezTo>
+                  <a:cubicBezTo>
+                    <a:pt x="7140" y="1665"/>
+                    <a:pt x="7166" y="1674"/>
+                    <a:pt x="7186" y="1691"/>
+                  </a:cubicBezTo>
+                  <a:lnTo>
+                    <a:pt x="12472" y="6283"/>
+                  </a:lnTo>
+                  <a:lnTo>
+                    <a:pt x="14081" y="6283"/>
+                  </a:lnTo>
+                  <a:cubicBezTo>
+                    <a:pt x="14185" y="6283"/>
+                    <a:pt x="14234" y="6158"/>
+                    <a:pt x="14150" y="6089"/>
+                  </a:cubicBezTo>
+                  <a:lnTo>
+                    <a:pt x="7186" y="27"/>
+                  </a:lnTo>
+                  <a:cubicBezTo>
+                    <a:pt x="7166" y="9"/>
+                    <a:pt x="7140" y="1"/>
+                    <a:pt x="7114" y="1"/>
+                  </a:cubicBezTo>
+                  <a:close/>
+                </a:path>
+              </a:pathLst>
+            </a:custGeom>
+            <a:solidFill>
+              <a:srgbClr val="FF9A75"/>
+            </a:solidFill>
+            <a:ln>
+              <a:noFill/>
+            </a:ln>
+          </p:spPr>
+          <p:txBody>
+            <a:bodyPr spcFirstLastPara="1" wrap="square" lIns="91425" tIns="91425" rIns="91425" bIns="91425" anchor="ctr" anchorCtr="0">
+              <a:noAutofit/>
+            </a:bodyPr>
+            <a:lstStyle/>
+            <a:p>
+              <a:pPr marL="0" lvl="0" indent="0" algn="l" rtl="0">
+                <a:spcBef>
+                  <a:spcPts val="0"/>
+                </a:spcBef>
+                <a:spcAft>
+                  <a:spcPts val="0"/>
+                </a:spcAft>
+                <a:buNone/>
+              </a:pPr>
+              <a:endParaRPr/>
+            </a:p>
+          </p:txBody>
+        </p:sp>
+        <p:sp>
+          <p:nvSpPr>
+            <p:cNvPr id="241" name="Google Shape;241;p27"/>
+            <p:cNvSpPr/>
+            <p:nvPr/>
+          </p:nvSpPr>
+          <p:spPr>
+            <a:xfrm>
+              <a:off x="338496" y="4446675"/>
+              <a:ext cx="14697" cy="12908"/>
+            </a:xfrm>
+            <a:custGeom>
+              <a:avLst/>
+              <a:gdLst/>
+              <a:ahLst/>
+              <a:cxnLst/>
+              <a:rect l="l" t="t" r="r" b="b"/>
+              <a:pathLst>
+                <a:path w="965" h="847" extrusionOk="0">
+                  <a:moveTo>
+                    <a:pt x="1" y="0"/>
+                  </a:moveTo>
+                  <a:lnTo>
+                    <a:pt x="1" y="847"/>
+                  </a:lnTo>
+                  <a:lnTo>
+                    <a:pt x="847" y="847"/>
+                  </a:lnTo>
+                  <a:cubicBezTo>
+                    <a:pt x="909" y="847"/>
+                    <a:pt x="965" y="791"/>
+                    <a:pt x="965" y="729"/>
+                  </a:cubicBezTo>
+                  <a:lnTo>
+                    <a:pt x="965" y="118"/>
+                  </a:lnTo>
+                  <a:cubicBezTo>
+                    <a:pt x="965" y="56"/>
+                    <a:pt x="909" y="0"/>
+                    <a:pt x="847" y="0"/>
+                  </a:cubicBezTo>
+                  <a:close/>
+                </a:path>
+              </a:pathLst>
+            </a:custGeom>
+            <a:solidFill>
+              <a:srgbClr val="FF7058"/>
+            </a:solidFill>
+            <a:ln>
+              <a:noFill/>
+            </a:ln>
+          </p:spPr>
+          <p:txBody>
+            <a:bodyPr spcFirstLastPara="1" wrap="square" lIns="91425" tIns="91425" rIns="91425" bIns="91425" anchor="ctr" anchorCtr="0">
+              <a:noAutofit/>
+            </a:bodyPr>
+            <a:lstStyle/>
+            <a:p>
+              <a:pPr marL="0" lvl="0" indent="0" algn="l" rtl="0">
+                <a:spcBef>
+                  <a:spcPts val="0"/>
+                </a:spcBef>
+                <a:spcAft>
+                  <a:spcPts val="0"/>
+                </a:spcAft>
+                <a:buNone/>
+              </a:pPr>
+              <a:endParaRPr/>
+            </a:p>
+          </p:txBody>
+        </p:sp>
+      </p:grpSp>
+      <p:sp>
+        <p:nvSpPr>
+          <p:cNvPr id="242" name="Google Shape;242;p27"/>
+          <p:cNvSpPr txBox="1"/>
+          <p:nvPr/>
+        </p:nvSpPr>
+        <p:spPr>
+          <a:xfrm>
+            <a:off x="1026488" y="90250"/>
+            <a:ext cx="743100" cy="198900"/>
+          </a:xfrm>
+          <a:prstGeom prst="rect">
+            <a:avLst/>
+          </a:prstGeom>
+          <a:noFill/>
+          <a:ln>
+            <a:noFill/>
+          </a:ln>
+        </p:spPr>
+        <p:txBody>
+          <a:bodyPr spcFirstLastPara="1" wrap="square" lIns="91425" tIns="182875" rIns="91425" bIns="0" anchor="ctr" anchorCtr="0">
+            <a:noAutofit/>
+          </a:bodyPr>
+          <a:lstStyle/>
+          <a:p>
+            <a:pPr marL="0" marR="45720" lvl="0" indent="0" algn="ctr" rtl="0">
+              <a:spcBef>
+                <a:spcPts val="0"/>
+              </a:spcBef>
+              <a:spcAft>
+                <a:spcPts val="1600"/>
+              </a:spcAft>
+              <a:buNone/>
+            </a:pPr>
+            <a:r>
+              <a:rPr lang="en" sz="1200">
+                <a:solidFill>
+                  <a:schemeClr val="dk1"/>
+                </a:solidFill>
+                <a:latin typeface="Abel"/>
+                <a:ea typeface="Abel"/>
+                <a:cs typeface="Abel"/>
+                <a:sym typeface="Abel"/>
+              </a:rPr>
+              <a:t>Slidesgo</a:t>
+            </a:r>
+            <a:endParaRPr sz="1200">
+              <a:solidFill>
+                <a:schemeClr val="dk1"/>
+              </a:solidFill>
+              <a:latin typeface="Abel"/>
+              <a:ea typeface="Abel"/>
+              <a:cs typeface="Abel"/>
+              <a:sym typeface="Abel"/>
+            </a:endParaRPr>
+          </a:p>
+        </p:txBody>
+      </p:sp>
+      <p:sp>
+        <p:nvSpPr>
+          <p:cNvPr id="243" name="Google Shape;243;p27"/>
+          <p:cNvSpPr txBox="1"/>
+          <p:nvPr/>
+        </p:nvSpPr>
+        <p:spPr>
+          <a:xfrm>
+            <a:off x="2459375" y="90250"/>
+            <a:ext cx="693900" cy="198900"/>
+          </a:xfrm>
+          <a:prstGeom prst="rect">
+            <a:avLst/>
+          </a:prstGeom>
+          <a:noFill/>
+          <a:ln>
+            <a:noFill/>
+          </a:ln>
+        </p:spPr>
+        <p:txBody>
+          <a:bodyPr spcFirstLastPara="1" wrap="square" lIns="91425" tIns="182875" rIns="91425" bIns="0" anchor="ctr" anchorCtr="0">
+            <a:noAutofit/>
+          </a:bodyPr>
+          <a:lstStyle/>
+          <a:p>
+            <a:pPr marL="0" marR="45720" lvl="0" indent="0" algn="ctr" rtl="0">
+              <a:spcBef>
+                <a:spcPts val="0"/>
+              </a:spcBef>
+              <a:spcAft>
+                <a:spcPts val="1600"/>
+              </a:spcAft>
+              <a:buNone/>
+            </a:pPr>
+            <a:r>
+              <a:rPr lang="en" sz="1200">
+                <a:solidFill>
+                  <a:schemeClr val="dk1"/>
+                </a:solidFill>
+                <a:latin typeface="Abel"/>
+                <a:ea typeface="Abel"/>
+                <a:cs typeface="Abel"/>
+                <a:sym typeface="Abel"/>
+              </a:rPr>
+              <a:t>School</a:t>
+            </a:r>
+            <a:endParaRPr sz="1200">
+              <a:solidFill>
+                <a:schemeClr val="dk1"/>
+              </a:solidFill>
+              <a:latin typeface="Abel"/>
+              <a:ea typeface="Abel"/>
+              <a:cs typeface="Abel"/>
+              <a:sym typeface="Abel"/>
+            </a:endParaRPr>
+          </a:p>
+        </p:txBody>
+      </p:sp>
+      <p:sp>
+        <p:nvSpPr>
+          <p:cNvPr id="244" name="Google Shape;244;p27"/>
+          <p:cNvSpPr txBox="1"/>
+          <p:nvPr/>
+        </p:nvSpPr>
+        <p:spPr>
+          <a:xfrm>
+            <a:off x="3768902" y="90250"/>
+            <a:ext cx="891600" cy="198900"/>
+          </a:xfrm>
+          <a:prstGeom prst="rect">
+            <a:avLst/>
+          </a:prstGeom>
+          <a:noFill/>
+          <a:ln>
+            <a:noFill/>
+          </a:ln>
+        </p:spPr>
+        <p:txBody>
+          <a:bodyPr spcFirstLastPara="1" wrap="square" lIns="91425" tIns="182875" rIns="91425" bIns="0" anchor="ctr" anchorCtr="0">
+            <a:noAutofit/>
+          </a:bodyPr>
+          <a:lstStyle/>
+          <a:p>
+            <a:pPr marL="0" marR="45720" lvl="0" indent="0" algn="ctr" rtl="0">
+              <a:spcBef>
+                <a:spcPts val="0"/>
+              </a:spcBef>
+              <a:spcAft>
+                <a:spcPts val="1600"/>
+              </a:spcAft>
+              <a:buNone/>
+            </a:pPr>
+            <a:r>
+              <a:rPr lang="en" sz="1200">
+                <a:solidFill>
+                  <a:schemeClr val="dk1"/>
+                </a:solidFill>
+                <a:latin typeface="Abel"/>
+                <a:ea typeface="Abel"/>
+                <a:cs typeface="Abel"/>
+                <a:sym typeface="Abel"/>
+              </a:rPr>
+              <a:t>Resources</a:t>
+            </a:r>
+            <a:endParaRPr sz="1200">
+              <a:solidFill>
+                <a:schemeClr val="dk1"/>
+              </a:solidFill>
+              <a:latin typeface="Abel"/>
+              <a:ea typeface="Abel"/>
+              <a:cs typeface="Abel"/>
+              <a:sym typeface="Abel"/>
+            </a:endParaRPr>
+          </a:p>
+        </p:txBody>
+      </p:sp>
+      <p:sp>
+        <p:nvSpPr>
+          <p:cNvPr id="245" name="Google Shape;245;p27"/>
+          <p:cNvSpPr txBox="1">
+            <a:spLocks noGrp="1"/>
+          </p:cNvSpPr>
+          <p:nvPr>
+            <p:ph type="body" idx="1"/>
+          </p:nvPr>
+        </p:nvSpPr>
+        <p:spPr>
+          <a:xfrm>
+            <a:off x="732525" y="1371800"/>
+            <a:ext cx="7674600" cy="3257100"/>
+          </a:xfrm>
+          <a:prstGeom prst="rect">
+            <a:avLst/>
+          </a:prstGeom>
+        </p:spPr>
+        <p:txBody>
+          <a:bodyPr spcFirstLastPara="1" wrap="square" lIns="91425" tIns="91425" rIns="91425" bIns="91425" anchor="t" anchorCtr="0">
+            <a:noAutofit/>
+          </a:bodyPr>
+          <a:lstStyle/>
+          <a:p>
+            <a:pPr marL="0" lvl="0" indent="0" algn="just" rtl="0">
+              <a:spcBef>
+                <a:spcPts val="0"/>
+              </a:spcBef>
+              <a:spcAft>
+                <a:spcPts val="0"/>
+              </a:spcAft>
+              <a:buClr>
+                <a:schemeClr val="bg1"/>
+              </a:buClr>
+              <a:buSzPts val="1100"/>
+              <a:buNone/>
+            </a:pPr>
+            <a:r>
+              <a:rPr lang="en-US" sz="1800" dirty="0">
+                <a:solidFill>
+                  <a:schemeClr val="lt1"/>
+                </a:solidFill>
+              </a:rPr>
+              <a:t>In order to Install PostgreSQL you need to:</a:t>
+            </a:r>
+          </a:p>
+          <a:p>
+            <a:pPr marL="0" lvl="0" indent="0" algn="just" rtl="0">
+              <a:spcBef>
+                <a:spcPts val="0"/>
+              </a:spcBef>
+              <a:spcAft>
+                <a:spcPts val="0"/>
+              </a:spcAft>
+              <a:buClr>
+                <a:schemeClr val="bg1"/>
+              </a:buClr>
+              <a:buSzPts val="1100"/>
+              <a:buNone/>
+            </a:pPr>
+            <a:r>
+              <a:rPr lang="en-US" sz="1800" dirty="0">
+                <a:solidFill>
+                  <a:schemeClr val="lt1"/>
+                </a:solidFill>
+              </a:rPr>
+              <a:t>- Visit PostgreSQL’s website and click download, also choose the installer according to your own Operating System</a:t>
+            </a:r>
+          </a:p>
+          <a:p>
+            <a:pPr marL="0" lvl="0" indent="0" algn="just" rtl="0">
+              <a:spcBef>
+                <a:spcPts val="0"/>
+              </a:spcBef>
+              <a:spcAft>
+                <a:spcPts val="0"/>
+              </a:spcAft>
+              <a:buClr>
+                <a:schemeClr val="bg1"/>
+              </a:buClr>
+              <a:buSzPts val="1100"/>
+              <a:buNone/>
+            </a:pPr>
+            <a:r>
+              <a:rPr lang="en-US" sz="1800" dirty="0">
+                <a:solidFill>
+                  <a:schemeClr val="lt1"/>
+                </a:solidFill>
+              </a:rPr>
+              <a:t>- After the download is completed, double click the installer to start the installing process</a:t>
+            </a:r>
+          </a:p>
+          <a:p>
+            <a:pPr marL="0" lvl="0" indent="0" algn="just" rtl="0">
+              <a:spcBef>
+                <a:spcPts val="0"/>
+              </a:spcBef>
+              <a:spcAft>
+                <a:spcPts val="0"/>
+              </a:spcAft>
+              <a:buClr>
+                <a:schemeClr val="bg1"/>
+              </a:buClr>
+              <a:buSzPts val="1100"/>
+              <a:buNone/>
+            </a:pPr>
+            <a:r>
+              <a:rPr lang="en-US" sz="1800" dirty="0">
+                <a:solidFill>
+                  <a:schemeClr val="lt1"/>
+                </a:solidFill>
+              </a:rPr>
+              <a:t>- Follow the steps inside the installer, if there’s some things that you don’t understand, you can follow the default configuration inside the installer</a:t>
+            </a:r>
+          </a:p>
+          <a:p>
+            <a:pPr marL="0" lvl="0" indent="0" algn="just" rtl="0">
+              <a:spcBef>
+                <a:spcPts val="0"/>
+              </a:spcBef>
+              <a:spcAft>
+                <a:spcPts val="0"/>
+              </a:spcAft>
+              <a:buClr>
+                <a:schemeClr val="bg1"/>
+              </a:buClr>
+              <a:buSzPts val="1100"/>
+              <a:buNone/>
+            </a:pPr>
+            <a:r>
+              <a:rPr lang="en-US" sz="1800" dirty="0">
+                <a:solidFill>
+                  <a:schemeClr val="lt1"/>
+                </a:solidFill>
+              </a:rPr>
+              <a:t>- After the installing process is completed, make sure that PostgreSQL is fully installed by running `</a:t>
+            </a:r>
+            <a:r>
+              <a:rPr lang="en-US" sz="1800" dirty="0" err="1">
+                <a:solidFill>
+                  <a:schemeClr val="lt1"/>
+                </a:solidFill>
+              </a:rPr>
+              <a:t>psql</a:t>
+            </a:r>
+            <a:r>
+              <a:rPr lang="en-US" sz="1800" dirty="0">
+                <a:solidFill>
+                  <a:schemeClr val="lt1"/>
+                </a:solidFill>
+              </a:rPr>
+              <a:t> –help`</a:t>
+            </a:r>
+          </a:p>
+          <a:p>
+            <a:pPr marL="0" lvl="0" indent="0" algn="just" rtl="0">
+              <a:spcBef>
+                <a:spcPts val="0"/>
+              </a:spcBef>
+              <a:spcAft>
+                <a:spcPts val="0"/>
+              </a:spcAft>
+              <a:buClr>
+                <a:schemeClr val="bg1"/>
+              </a:buClr>
+              <a:buSzPts val="1100"/>
+              <a:buNone/>
+            </a:pPr>
+            <a:r>
+              <a:rPr lang="en-US" sz="1800" dirty="0">
+                <a:solidFill>
+                  <a:schemeClr val="lt1"/>
+                </a:solidFill>
+              </a:rPr>
+              <a:t>- PostgreSQL </a:t>
+            </a:r>
+            <a:r>
+              <a:rPr lang="en-US" sz="1800">
+                <a:solidFill>
+                  <a:schemeClr val="lt1"/>
+                </a:solidFill>
+              </a:rPr>
+              <a:t>is installed.</a:t>
+            </a:r>
+            <a:endParaRPr lang="en-US" sz="1800" dirty="0">
+              <a:solidFill>
+                <a:schemeClr val="lt1"/>
+              </a:solidFill>
+            </a:endParaRPr>
+          </a:p>
+        </p:txBody>
+      </p:sp>
+      <p:sp>
+        <p:nvSpPr>
+          <p:cNvPr id="246" name="Google Shape;246;p27"/>
+          <p:cNvSpPr txBox="1">
+            <a:spLocks noGrp="1"/>
+          </p:cNvSpPr>
+          <p:nvPr>
+            <p:ph type="ctrTitle"/>
+          </p:nvPr>
+        </p:nvSpPr>
+        <p:spPr>
+          <a:xfrm>
+            <a:off x="632541" y="817880"/>
+            <a:ext cx="6979195" cy="321300"/>
+          </a:xfrm>
+          <a:prstGeom prst="rect">
+            <a:avLst/>
+          </a:prstGeom>
+        </p:spPr>
+        <p:txBody>
+          <a:bodyPr spcFirstLastPara="1" wrap="square" lIns="91425" tIns="91425" rIns="91425" bIns="91425" anchor="ctr" anchorCtr="0">
+            <a:noAutofit/>
+          </a:bodyPr>
+          <a:lstStyle/>
+          <a:p>
+            <a:pPr marL="0" lvl="0" indent="0" algn="ctr" rtl="0">
+              <a:spcBef>
+                <a:spcPts val="0"/>
+              </a:spcBef>
+              <a:spcAft>
+                <a:spcPts val="0"/>
+              </a:spcAft>
+              <a:buNone/>
+            </a:pPr>
+            <a:r>
+              <a:rPr lang="en" sz="4000" dirty="0">
+                <a:solidFill>
+                  <a:schemeClr val="lt1"/>
+                </a:solidFill>
+              </a:rPr>
+              <a:t>So the conclusion is?</a:t>
+            </a:r>
+            <a:endParaRPr sz="4000" dirty="0">
+              <a:solidFill>
+                <a:schemeClr val="lt1"/>
+              </a:solidFill>
+            </a:endParaRPr>
+          </a:p>
+        </p:txBody>
+      </p:sp>
+      <p:sp>
+        <p:nvSpPr>
+          <p:cNvPr id="247" name="Google Shape;247;p27">
+            <a:hlinkClick r:id="rId6" action="ppaction://hlinksldjump"/>
+          </p:cNvPr>
+          <p:cNvSpPr/>
+          <p:nvPr/>
+        </p:nvSpPr>
+        <p:spPr>
+          <a:xfrm>
+            <a:off x="-37" y="-6437"/>
+            <a:ext cx="693900" cy="392400"/>
+          </a:xfrm>
+          <a:prstGeom prst="rect">
+            <a:avLst/>
+          </a:prstGeom>
+          <a:noFill/>
+          <a:ln>
+            <a:noFill/>
+          </a:ln>
+        </p:spPr>
+        <p:txBody>
+          <a:bodyPr spcFirstLastPara="1" wrap="square" lIns="91425" tIns="91425" rIns="91425" bIns="91425" anchor="ctr" anchorCtr="0">
+            <a:noAutofit/>
+          </a:bodyPr>
+          <a:lstStyle/>
+          <a:p>
+            <a:pPr marL="0" lvl="0" indent="0" algn="l" rtl="0">
+              <a:spcBef>
+                <a:spcPts val="0"/>
+              </a:spcBef>
+              <a:spcAft>
+                <a:spcPts val="0"/>
+              </a:spcAft>
+              <a:buNone/>
+            </a:pPr>
+            <a:endParaRPr/>
+          </a:p>
+        </p:txBody>
+      </p:sp>
+      <p:sp>
+        <p:nvSpPr>
+          <p:cNvPr id="248" name="Google Shape;248;p27"/>
+          <p:cNvSpPr txBox="1"/>
+          <p:nvPr/>
+        </p:nvSpPr>
+        <p:spPr>
+          <a:xfrm>
+            <a:off x="5149500" y="90325"/>
+            <a:ext cx="947100" cy="198900"/>
+          </a:xfrm>
+          <a:prstGeom prst="rect">
+            <a:avLst/>
+          </a:prstGeom>
+          <a:noFill/>
+          <a:ln>
+            <a:noFill/>
+          </a:ln>
+        </p:spPr>
+        <p:txBody>
+          <a:bodyPr spcFirstLastPara="1" wrap="square" lIns="91425" tIns="182875" rIns="91425" bIns="0" anchor="ctr" anchorCtr="0">
+            <a:noAutofit/>
+          </a:bodyPr>
+          <a:lstStyle/>
+          <a:p>
+            <a:pPr marL="0" marR="45720" lvl="0" indent="0" algn="ctr" rtl="0">
+              <a:spcBef>
+                <a:spcPts val="0"/>
+              </a:spcBef>
+              <a:spcAft>
+                <a:spcPts val="1600"/>
+              </a:spcAft>
+              <a:buNone/>
+            </a:pPr>
+            <a:r>
+              <a:rPr lang="en" sz="1200">
+                <a:solidFill>
+                  <a:schemeClr val="dk1"/>
+                </a:solidFill>
+                <a:latin typeface="Abel"/>
+                <a:ea typeface="Abel"/>
+                <a:cs typeface="Abel"/>
+                <a:sym typeface="Abel"/>
+              </a:rPr>
+              <a:t>Instructions</a:t>
+            </a:r>
+            <a:endParaRPr sz="1200">
+              <a:solidFill>
+                <a:schemeClr val="dk1"/>
+              </a:solidFill>
+              <a:latin typeface="Abel"/>
+              <a:ea typeface="Abel"/>
+              <a:cs typeface="Abel"/>
+              <a:sym typeface="Abel"/>
+            </a:endParaRPr>
+          </a:p>
+        </p:txBody>
+      </p:sp>
+      <p:sp>
+        <p:nvSpPr>
+          <p:cNvPr id="249" name="Google Shape;249;p27"/>
+          <p:cNvSpPr txBox="1"/>
+          <p:nvPr/>
+        </p:nvSpPr>
+        <p:spPr>
+          <a:xfrm>
+            <a:off x="6537200" y="90250"/>
+            <a:ext cx="988500" cy="198900"/>
+          </a:xfrm>
+          <a:prstGeom prst="rect">
+            <a:avLst/>
+          </a:prstGeom>
+          <a:noFill/>
+          <a:ln>
+            <a:noFill/>
+          </a:ln>
+        </p:spPr>
+        <p:txBody>
+          <a:bodyPr spcFirstLastPara="1" wrap="square" lIns="91425" tIns="182875" rIns="91425" bIns="0" anchor="ctr" anchorCtr="0">
+            <a:noAutofit/>
+          </a:bodyPr>
+          <a:lstStyle/>
+          <a:p>
+            <a:pPr marL="0" marR="45720" lvl="0" indent="0" algn="ctr" rtl="0">
+              <a:spcBef>
+                <a:spcPts val="0"/>
+              </a:spcBef>
+              <a:spcAft>
+                <a:spcPts val="1600"/>
+              </a:spcAft>
+              <a:buNone/>
+            </a:pPr>
+            <a:r>
+              <a:rPr lang="en" sz="1200">
+                <a:solidFill>
+                  <a:schemeClr val="dk1"/>
+                </a:solidFill>
+                <a:latin typeface="Abel"/>
+                <a:ea typeface="Abel"/>
+                <a:cs typeface="Abel"/>
+                <a:sym typeface="Abel"/>
+              </a:rPr>
+              <a:t>Final Slides</a:t>
+            </a:r>
+            <a:endParaRPr sz="1200">
+              <a:solidFill>
+                <a:schemeClr val="dk1"/>
+              </a:solidFill>
+              <a:latin typeface="Abel"/>
+              <a:ea typeface="Abel"/>
+              <a:cs typeface="Abel"/>
+              <a:sym typeface="Abel"/>
+            </a:endParaRPr>
+          </a:p>
+        </p:txBody>
+      </p:sp>
+      <p:sp>
+        <p:nvSpPr>
+          <p:cNvPr id="250" name="Google Shape;250;p27"/>
+          <p:cNvSpPr txBox="1"/>
+          <p:nvPr/>
+        </p:nvSpPr>
+        <p:spPr>
+          <a:xfrm>
+            <a:off x="8159500" y="90250"/>
+            <a:ext cx="560400" cy="198900"/>
+          </a:xfrm>
+          <a:prstGeom prst="rect">
+            <a:avLst/>
+          </a:prstGeom>
+          <a:noFill/>
+          <a:ln>
+            <a:noFill/>
+          </a:ln>
+        </p:spPr>
+        <p:txBody>
+          <a:bodyPr spcFirstLastPara="1" wrap="square" lIns="91425" tIns="182875" rIns="91425" bIns="0" anchor="ctr" anchorCtr="0">
+            <a:noAutofit/>
+          </a:bodyPr>
+          <a:lstStyle/>
+          <a:p>
+            <a:pPr marL="0" marR="45720" lvl="0" indent="0" algn="ctr" rtl="0">
+              <a:spcBef>
+                <a:spcPts val="0"/>
+              </a:spcBef>
+              <a:spcAft>
+                <a:spcPts val="1600"/>
+              </a:spcAft>
+              <a:buNone/>
+            </a:pPr>
+            <a:r>
+              <a:rPr lang="en" sz="1200">
+                <a:solidFill>
+                  <a:schemeClr val="dk1"/>
+                </a:solidFill>
+                <a:latin typeface="Abel"/>
+                <a:ea typeface="Abel"/>
+                <a:cs typeface="Abel"/>
+                <a:sym typeface="Abel"/>
+              </a:rPr>
+              <a:t>FAQ</a:t>
+            </a:r>
+            <a:endParaRPr sz="1200">
+              <a:solidFill>
+                <a:schemeClr val="dk1"/>
+              </a:solidFill>
+              <a:latin typeface="Abel"/>
+              <a:ea typeface="Abel"/>
+              <a:cs typeface="Abel"/>
+              <a:sym typeface="Abel"/>
+            </a:endParaRPr>
+          </a:p>
+        </p:txBody>
+      </p:sp>
+      <p:pic>
+        <p:nvPicPr>
+          <p:cNvPr id="3" name="Picture 2" descr="A blue elephant head with white outline on black background&#10;&#10;Description automatically generated">
+            <a:extLst>
+              <a:ext uri="{FF2B5EF4-FFF2-40B4-BE49-F238E27FC236}">
+                <a16:creationId xmlns:a16="http://schemas.microsoft.com/office/drawing/2014/main" id="{F219EB3A-6F9C-FB22-547F-01C86686BA8C}"/>
+              </a:ext>
+            </a:extLst>
+          </p:cNvPr>
+          <p:cNvPicPr>
+            <a:picLocks noChangeAspect="1"/>
+          </p:cNvPicPr>
+          <p:nvPr/>
+        </p:nvPicPr>
+        <p:blipFill>
+          <a:blip r:embed="rId7"/>
+          <a:stretch>
+            <a:fillRect/>
+          </a:stretch>
+        </p:blipFill>
+        <p:spPr>
+          <a:xfrm>
+            <a:off x="7157302" y="605391"/>
+            <a:ext cx="764283" cy="746278"/>
+          </a:xfrm>
+          <a:prstGeom prst="rect">
+            <a:avLst/>
+          </a:prstGeom>
+        </p:spPr>
+      </p:pic>
+    </p:spTree>
+    <p:extLst>
+      <p:ext uri="{BB962C8B-B14F-4D97-AF65-F5344CB8AC3E}">
+        <p14:creationId xmlns:p14="http://schemas.microsoft.com/office/powerpoint/2010/main" val="3205246658"/>
+      </p:ext>
+    </p:extLst>
+  </p:cSld>
+  <p:clrMapOvr>
+    <a:masterClrMapping/>
+  </p:clrMapOvr>
+</p:sld>
+</file>
+
+<file path=ppt/slides/slide18.xml><?xml version="1.0" encoding="utf-8"?>
 <p:sld xmlns:a="http://schemas.openxmlformats.org/drawingml/2006/main" xmlns:r="http://schemas.openxmlformats.org/officeDocument/2006/relationships" xmlns:p="http://schemas.openxmlformats.org/presentationml/2006/main">
   <p:cSld>
     <p:bg>

</xml_diff>